<commit_message>
add why python to python basics
</commit_message>
<xml_diff>
--- a/1 Python Basics.pptx
+++ b/1 Python Basics.pptx
@@ -6879,7 +6879,7 @@
           <a:p>
             <a:fld id="{7CEEE0ED-A0F5-4442-9C94-5288E26FF1D3}" type="datetimeFigureOut">
               <a:rPr lang="fa-IR" smtClean="0"/>
-              <a:t>12/09/1444</a:t>
+              <a:t>13/09/1444</a:t>
             </a:fld>
             <a:endParaRPr lang="fa-IR"/>
           </a:p>
@@ -20589,66 +20589,6 @@
       </p:sp>
       <p:sp>
         <p:nvSpPr>
-          <p:cNvPr id="3" name="Text Placeholder 2">
-            <a:extLst>
-              <a:ext uri="{FF2B5EF4-FFF2-40B4-BE49-F238E27FC236}">
-                <a16:creationId xmlns:a16="http://schemas.microsoft.com/office/drawing/2014/main" id="{58BE3078-8B89-4550-B497-93E4DADBD57E}"/>
-              </a:ext>
-            </a:extLst>
-          </p:cNvPr>
-          <p:cNvSpPr>
-            <a:spLocks noGrp="1"/>
-          </p:cNvSpPr>
-          <p:nvPr>
-            <p:ph type="body" idx="1"/>
-          </p:nvPr>
-        </p:nvSpPr>
-        <p:spPr>
-          <a:xfrm>
-            <a:off x="786149" y="1142608"/>
-            <a:ext cx="4406635" cy="3626431"/>
-          </a:xfrm>
-        </p:spPr>
-        <p:txBody>
-          <a:bodyPr/>
-          <a:lstStyle/>
-          <a:p>
-            <a:pPr marL="76200" indent="0">
-              <a:buNone/>
-            </a:pPr>
-            <a:r>
-              <a:rPr lang="en-US" sz="1400" dirty="0"/>
-              <a:t>Simple syntax</a:t>
-            </a:r>
-          </a:p>
-          <a:p>
-            <a:pPr marL="76200" indent="0">
-              <a:buNone/>
-            </a:pPr>
-            <a:r>
-              <a:rPr lang="en-US" sz="1400" dirty="0"/>
-              <a:t>Fewer lines</a:t>
-            </a:r>
-          </a:p>
-          <a:p>
-            <a:pPr marL="76200" indent="0">
-              <a:buNone/>
-            </a:pPr>
-            <a:r>
-              <a:rPr lang="en-US" sz="1400" dirty="0"/>
-              <a:t>Different platforms </a:t>
-            </a:r>
-          </a:p>
-          <a:p>
-            <a:pPr marL="76200" indent="0">
-              <a:buNone/>
-            </a:pPr>
-            <a:endParaRPr lang="en-US" sz="1400" dirty="0"/>
-          </a:p>
-        </p:txBody>
-      </p:sp>
-      <p:sp>
-        <p:nvSpPr>
           <p:cNvPr id="4" name="Slide Number Placeholder 3">
             <a:extLst>
               <a:ext uri="{FF2B5EF4-FFF2-40B4-BE49-F238E27FC236}">
@@ -20687,10 +20627,10 @@
       </p:sp>
       <p:pic>
         <p:nvPicPr>
-          <p:cNvPr id="6" name="Picture 5">
+          <p:cNvPr id="9" name="Picture 8">
             <a:extLst>
               <a:ext uri="{FF2B5EF4-FFF2-40B4-BE49-F238E27FC236}">
-                <a16:creationId xmlns:a16="http://schemas.microsoft.com/office/drawing/2014/main" id="{683F14F1-B97C-4890-9C42-653B2D0F5155}"/>
+                <a16:creationId xmlns:a16="http://schemas.microsoft.com/office/drawing/2014/main" id="{C838AF42-7A2B-4C94-8F38-6BBD63194B28}"/>
               </a:ext>
             </a:extLst>
           </p:cNvPr>
@@ -20700,50 +20640,94 @@
           <p:nvPr/>
         </p:nvPicPr>
         <p:blipFill>
-          <a:blip r:embed="rId2">
-            <a:extLst>
-              <a:ext uri="{BEBA8EAE-BF5A-486C-A8C5-ECC9F3942E4B}">
-                <a14:imgProps xmlns:a14="http://schemas.microsoft.com/office/drawing/2010/main">
-                  <a14:imgLayer r:embed="rId3">
-                    <a14:imgEffect>
-                      <a14:backgroundRemoval t="278" b="99815" l="2148" r="92148">
-                        <a14:foregroundMark x1="43556" y1="82963" x2="26000" y2="83981"/>
-                        <a14:foregroundMark x1="26000" y1="83981" x2="9630" y2="96111"/>
-                        <a14:foregroundMark x1="9630" y1="96111" x2="50815" y2="84630"/>
-                        <a14:foregroundMark x1="50815" y1="84630" x2="71852" y2="85648"/>
-                        <a14:foregroundMark x1="71852" y1="85648" x2="89630" y2="85463"/>
-                        <a14:foregroundMark x1="89630" y1="85463" x2="69185" y2="97593"/>
-                        <a14:foregroundMark x1="69185" y1="97593" x2="47111" y2="95278"/>
-                        <a14:foregroundMark x1="47111" y1="95278" x2="42370" y2="98981"/>
-                        <a14:foregroundMark x1="92444" y1="90093" x2="89407" y2="83148"/>
-                        <a14:foregroundMark x1="7556" y1="82315" x2="6593" y2="99630"/>
-                        <a14:foregroundMark x1="4074" y1="96667" x2="2296" y2="99815"/>
-                        <a14:foregroundMark x1="36222" y1="95556" x2="21630" y2="99444"/>
-                        <a14:foregroundMark x1="36370" y1="97037" x2="35407" y2="99167"/>
-                        <a14:foregroundMark x1="37111" y1="96296" x2="40815" y2="97870"/>
-                        <a14:foregroundMark x1="42444" y1="99444" x2="35778" y2="99444"/>
-                        <a14:foregroundMark x1="32741" y1="13148" x2="52889" y2="9167"/>
-                        <a14:foregroundMark x1="52889" y1="9167" x2="44444" y2="9722"/>
-                        <a14:foregroundMark x1="68074" y1="11204" x2="62222" y2="278"/>
-                      </a14:backgroundRemoval>
-                    </a14:imgEffect>
-                  </a14:imgLayer>
-                </a14:imgProps>
-              </a:ext>
-            </a:extLst>
-          </a:blip>
+          <a:blip r:embed="rId2"/>
           <a:stretch>
             <a:fillRect/>
           </a:stretch>
         </p:blipFill>
         <p:spPr>
           <a:xfrm>
-            <a:off x="5602662" y="1853748"/>
-            <a:ext cx="2755188" cy="2204150"/>
+            <a:off x="739812" y="1844071"/>
+            <a:ext cx="1979675" cy="2070410"/>
           </a:xfrm>
           <a:prstGeom prst="rect">
             <a:avLst/>
           </a:prstGeom>
+          <a:ln>
+            <a:solidFill>
+              <a:schemeClr val="accent3"/>
+            </a:solidFill>
+          </a:ln>
+        </p:spPr>
+      </p:pic>
+      <p:pic>
+        <p:nvPicPr>
+          <p:cNvPr id="13" name="Picture 12">
+            <a:extLst>
+              <a:ext uri="{FF2B5EF4-FFF2-40B4-BE49-F238E27FC236}">
+                <a16:creationId xmlns:a16="http://schemas.microsoft.com/office/drawing/2014/main" id="{A56C11E7-755C-42DF-B01A-99AF340C4BEC}"/>
+              </a:ext>
+            </a:extLst>
+          </p:cNvPr>
+          <p:cNvPicPr>
+            <a:picLocks noChangeAspect="1"/>
+          </p:cNvPicPr>
+          <p:nvPr/>
+        </p:nvPicPr>
+        <p:blipFill>
+          <a:blip r:embed="rId3"/>
+          <a:stretch>
+            <a:fillRect/>
+          </a:stretch>
+        </p:blipFill>
+        <p:spPr>
+          <a:xfrm>
+            <a:off x="3241481" y="1216128"/>
+            <a:ext cx="2661037" cy="3326296"/>
+          </a:xfrm>
+          <a:prstGeom prst="rect">
+            <a:avLst/>
+          </a:prstGeom>
+          <a:ln>
+            <a:solidFill>
+              <a:schemeClr val="accent3"/>
+            </a:solidFill>
+          </a:ln>
+        </p:spPr>
+      </p:pic>
+      <p:pic>
+        <p:nvPicPr>
+          <p:cNvPr id="16" name="Picture 15">
+            <a:extLst>
+              <a:ext uri="{FF2B5EF4-FFF2-40B4-BE49-F238E27FC236}">
+                <a16:creationId xmlns:a16="http://schemas.microsoft.com/office/drawing/2014/main" id="{5648C1C3-CB3D-4A2C-BE4F-1388D71CE5A9}"/>
+              </a:ext>
+            </a:extLst>
+          </p:cNvPr>
+          <p:cNvPicPr>
+            <a:picLocks noChangeAspect="1"/>
+          </p:cNvPicPr>
+          <p:nvPr/>
+        </p:nvPicPr>
+        <p:blipFill>
+          <a:blip r:embed="rId4"/>
+          <a:stretch>
+            <a:fillRect/>
+          </a:stretch>
+        </p:blipFill>
+        <p:spPr>
+          <a:xfrm>
+            <a:off x="6424512" y="1864693"/>
+            <a:ext cx="1979675" cy="2029167"/>
+          </a:xfrm>
+          <a:prstGeom prst="rect">
+            <a:avLst/>
+          </a:prstGeom>
+          <a:ln>
+            <a:solidFill>
+              <a:schemeClr val="accent3"/>
+            </a:solidFill>
+          </a:ln>
         </p:spPr>
       </p:pic>
     </p:spTree>

</xml_diff>

<commit_message>
add requests module to python basics
</commit_message>
<xml_diff>
--- a/1 Python Basics.pptx
+++ b/1 Python Basics.pptx
@@ -5,10 +5,10 @@
     <p:sldMasterId id="2147483658" r:id="rId1"/>
   </p:sldMasterIdLst>
   <p:notesMasterIdLst>
-    <p:notesMasterId r:id="rId45"/>
+    <p:notesMasterId r:id="rId46"/>
   </p:notesMasterIdLst>
   <p:handoutMasterIdLst>
-    <p:handoutMasterId r:id="rId46"/>
+    <p:handoutMasterId r:id="rId47"/>
   </p:handoutMasterIdLst>
   <p:sldIdLst>
     <p:sldId id="256" r:id="rId2"/>
@@ -54,35 +54,36 @@
     <p:sldId id="329" r:id="rId42"/>
     <p:sldId id="327" r:id="rId43"/>
     <p:sldId id="325" r:id="rId44"/>
+    <p:sldId id="340" r:id="rId45"/>
   </p:sldIdLst>
   <p:sldSz cx="9144000" cy="5143500" type="screen16x9"/>
   <p:notesSz cx="6858000" cy="9144000"/>
   <p:embeddedFontLst>
     <p:embeddedFont>
       <p:font typeface="Consolas" panose="020B0609020204030204" pitchFamily="49" charset="0"/>
-      <p:regular r:id="rId47"/>
-      <p:bold r:id="rId48"/>
-      <p:italic r:id="rId49"/>
-      <p:boldItalic r:id="rId50"/>
+      <p:regular r:id="rId48"/>
+      <p:bold r:id="rId49"/>
+      <p:italic r:id="rId50"/>
+      <p:boldItalic r:id="rId51"/>
     </p:embeddedFont>
     <p:embeddedFont>
       <p:font typeface="Roboto Slab" panose="020B0604020202020204" charset="0"/>
-      <p:regular r:id="rId51"/>
-      <p:bold r:id="rId52"/>
+      <p:regular r:id="rId52"/>
+      <p:bold r:id="rId53"/>
     </p:embeddedFont>
     <p:embeddedFont>
       <p:font typeface="Source Sans Pro" panose="020B0503030403020204" pitchFamily="34" charset="0"/>
-      <p:regular r:id="rId53"/>
-      <p:bold r:id="rId54"/>
-      <p:italic r:id="rId55"/>
-      <p:boldItalic r:id="rId56"/>
+      <p:regular r:id="rId54"/>
+      <p:bold r:id="rId55"/>
+      <p:italic r:id="rId56"/>
+      <p:boldItalic r:id="rId57"/>
     </p:embeddedFont>
     <p:embeddedFont>
       <p:font typeface="Trebuchet MS" panose="020B0603020202020204" pitchFamily="34" charset="0"/>
-      <p:regular r:id="rId57"/>
-      <p:bold r:id="rId58"/>
-      <p:italic r:id="rId59"/>
-      <p:boldItalic r:id="rId60"/>
+      <p:regular r:id="rId58"/>
+      <p:bold r:id="rId59"/>
+      <p:italic r:id="rId60"/>
+      <p:boldItalic r:id="rId61"/>
     </p:embeddedFont>
   </p:embeddedFontLst>
   <p:defaultTextStyle>
@@ -26390,7 +26391,156 @@
                 </a:solidFill>
                 <a:latin typeface="Consolas" panose="020B0609020204030204" pitchFamily="49" charset="0"/>
               </a:rPr>
+              <a:t>.exp(</a:t>
+            </a:r>
+            <a:r>
+              <a:rPr lang="en-US" sz="1100">
+                <a:latin typeface="Consolas" panose="020B0609020204030204" pitchFamily="49" charset="0"/>
+              </a:rPr>
+              <a:t>5</a:t>
+            </a:r>
+            <a:r>
+              <a:rPr lang="en-US" sz="1100">
+                <a:solidFill>
+                  <a:schemeClr val="accent1"/>
+                </a:solidFill>
+                <a:latin typeface="Consolas" panose="020B0609020204030204" pitchFamily="49" charset="0"/>
+              </a:rPr>
+              <a:t>)</a:t>
+            </a:r>
+            <a:r>
+              <a:rPr lang="en-US" sz="1100">
+                <a:latin typeface="Consolas" panose="020B0609020204030204" pitchFamily="49" charset="0"/>
+              </a:rPr>
+              <a:t>)</a:t>
+            </a:r>
+          </a:p>
+          <a:p>
+            <a:pPr marL="76200" indent="0">
+              <a:buNone/>
+            </a:pPr>
+            <a:r>
+              <a:rPr lang="en-US" sz="1100">
+                <a:latin typeface="Consolas" panose="020B0609020204030204" pitchFamily="49" charset="0"/>
+              </a:rPr>
+              <a:t>print(math</a:t>
+            </a:r>
+            <a:r>
+              <a:rPr lang="en-US" sz="1100">
+                <a:solidFill>
+                  <a:schemeClr val="accent1"/>
+                </a:solidFill>
+                <a:latin typeface="Consolas" panose="020B0609020204030204" pitchFamily="49" charset="0"/>
+              </a:rPr>
+              <a:t>.factorial(</a:t>
+            </a:r>
+            <a:r>
+              <a:rPr lang="en-US" sz="1100">
+                <a:latin typeface="Consolas" panose="020B0609020204030204" pitchFamily="49" charset="0"/>
+              </a:rPr>
+              <a:t>5</a:t>
+            </a:r>
+            <a:r>
+              <a:rPr lang="en-US" sz="1100">
+                <a:solidFill>
+                  <a:schemeClr val="accent1"/>
+                </a:solidFill>
+                <a:latin typeface="Consolas" panose="020B0609020204030204" pitchFamily="49" charset="0"/>
+              </a:rPr>
+              <a:t>)</a:t>
+            </a:r>
+            <a:r>
+              <a:rPr lang="en-US" sz="1100">
+                <a:latin typeface="Consolas" panose="020B0609020204030204" pitchFamily="49" charset="0"/>
+              </a:rPr>
+              <a:t>)</a:t>
+            </a:r>
+          </a:p>
+          <a:p>
+            <a:pPr marL="76200" indent="0">
+              <a:buNone/>
+            </a:pPr>
+            <a:r>
+              <a:rPr lang="en-US" sz="1100">
+                <a:latin typeface="Consolas" panose="020B0609020204030204" pitchFamily="49" charset="0"/>
+              </a:rPr>
+              <a:t>print(math</a:t>
+            </a:r>
+            <a:r>
+              <a:rPr lang="en-US" sz="1100">
+                <a:solidFill>
+                  <a:schemeClr val="accent1"/>
+                </a:solidFill>
+                <a:latin typeface="Consolas" panose="020B0609020204030204" pitchFamily="49" charset="0"/>
+              </a:rPr>
+              <a:t>.log(</a:t>
+            </a:r>
+            <a:r>
+              <a:rPr lang="en-US" sz="1100">
+                <a:latin typeface="Consolas" panose="020B0609020204030204" pitchFamily="49" charset="0"/>
+              </a:rPr>
+              <a:t>5</a:t>
+            </a:r>
+            <a:r>
+              <a:rPr lang="en-US" sz="1100">
+                <a:solidFill>
+                  <a:schemeClr val="accent1"/>
+                </a:solidFill>
+                <a:latin typeface="Consolas" panose="020B0609020204030204" pitchFamily="49" charset="0"/>
+              </a:rPr>
+              <a:t>)</a:t>
+            </a:r>
+            <a:r>
+              <a:rPr lang="en-US" sz="1100">
+                <a:latin typeface="Consolas" panose="020B0609020204030204" pitchFamily="49" charset="0"/>
+              </a:rPr>
+              <a:t>)</a:t>
+            </a:r>
+          </a:p>
+          <a:p>
+            <a:pPr marL="76200" indent="0">
+              <a:buNone/>
+            </a:pPr>
+            <a:r>
+              <a:rPr lang="en-US" sz="1100">
+                <a:latin typeface="Consolas" panose="020B0609020204030204" pitchFamily="49" charset="0"/>
+              </a:rPr>
+              <a:t>print(math</a:t>
+            </a:r>
+            <a:r>
+              <a:rPr lang="en-US" sz="1100">
+                <a:solidFill>
+                  <a:schemeClr val="accent1"/>
+                </a:solidFill>
+                <a:latin typeface="Consolas" panose="020B0609020204030204" pitchFamily="49" charset="0"/>
+              </a:rPr>
               <a:t>.pi</a:t>
+            </a:r>
+            <a:r>
+              <a:rPr lang="en-US" sz="1100">
+                <a:latin typeface="Consolas" panose="020B0609020204030204" pitchFamily="49" charset="0"/>
+              </a:rPr>
+              <a:t>)</a:t>
+            </a:r>
+          </a:p>
+          <a:p>
+            <a:pPr marL="76200" indent="0">
+              <a:buNone/>
+            </a:pPr>
+            <a:r>
+              <a:rPr lang="en-US" sz="1100">
+                <a:latin typeface="Consolas" panose="020B0609020204030204" pitchFamily="49" charset="0"/>
+              </a:rPr>
+              <a:t>print(math</a:t>
+            </a:r>
+            <a:r>
+              <a:rPr lang="en-US" sz="1100">
+                <a:solidFill>
+                  <a:schemeClr val="accent1"/>
+                </a:solidFill>
+                <a:latin typeface="Consolas" panose="020B0609020204030204" pitchFamily="49" charset="0"/>
+              </a:rPr>
+              <a:t>.e</a:t>
             </a:r>
             <a:r>
               <a:rPr lang="en-US" sz="1100">
@@ -26566,7 +26716,7 @@
               <a:rPr lang="en-US" sz="1100">
                 <a:latin typeface="Consolas" panose="020B0609020204030204" pitchFamily="49" charset="0"/>
               </a:rPr>
-              <a:t>myJson = '{ "name": "Alireza", "age": 24}'</a:t>
+              <a:t>myJson = '{ "name": "Alireza", "age": 24 }'</a:t>
             </a:r>
           </a:p>
           <a:p>
@@ -26716,6 +26866,298 @@
     <p:extLst>
       <p:ext uri="{BB962C8B-B14F-4D97-AF65-F5344CB8AC3E}">
         <p14:creationId xmlns:p14="http://schemas.microsoft.com/office/powerpoint/2010/main" val="3481581763"/>
+      </p:ext>
+    </p:extLst>
+  </p:cSld>
+  <p:clrMapOvr>
+    <a:masterClrMapping/>
+  </p:clrMapOvr>
+</p:sld>
+</file>
+
+<file path=ppt/slides/slide44.xml><?xml version="1.0" encoding="utf-8"?>
+<p:sld xmlns:a="http://schemas.openxmlformats.org/drawingml/2006/main" xmlns:r="http://schemas.openxmlformats.org/officeDocument/2006/relationships" xmlns:p="http://schemas.openxmlformats.org/presentationml/2006/main" show="0">
+  <p:cSld>
+    <p:spTree>
+      <p:nvGrpSpPr>
+        <p:cNvPr id="1" name=""/>
+        <p:cNvGrpSpPr/>
+        <p:nvPr/>
+      </p:nvGrpSpPr>
+      <p:grpSpPr>
+        <a:xfrm>
+          <a:off x="0" y="0"/>
+          <a:ext cx="0" cy="0"/>
+          <a:chOff x="0" y="0"/>
+          <a:chExt cx="0" cy="0"/>
+        </a:xfrm>
+      </p:grpSpPr>
+      <p:sp>
+        <p:nvSpPr>
+          <p:cNvPr id="2" name="Title 1">
+            <a:extLst>
+              <a:ext uri="{FF2B5EF4-FFF2-40B4-BE49-F238E27FC236}">
+                <a16:creationId xmlns:a16="http://schemas.microsoft.com/office/drawing/2014/main" id="{024AD384-5AD1-4435-A943-1241B2FACD62}"/>
+              </a:ext>
+            </a:extLst>
+          </p:cNvPr>
+          <p:cNvSpPr>
+            <a:spLocks noGrp="1"/>
+          </p:cNvSpPr>
+          <p:nvPr>
+            <p:ph type="title"/>
+          </p:nvPr>
+        </p:nvSpPr>
+        <p:spPr/>
+        <p:txBody>
+          <a:bodyPr/>
+          <a:lstStyle/>
+          <a:p>
+            <a:r>
+              <a:rPr lang="en"/>
+              <a:t>Requests</a:t>
+            </a:r>
+            <a:endParaRPr lang="fa-IR"/>
+          </a:p>
+        </p:txBody>
+      </p:sp>
+      <p:sp>
+        <p:nvSpPr>
+          <p:cNvPr id="3" name="Text Placeholder 2">
+            <a:extLst>
+              <a:ext uri="{FF2B5EF4-FFF2-40B4-BE49-F238E27FC236}">
+                <a16:creationId xmlns:a16="http://schemas.microsoft.com/office/drawing/2014/main" id="{58BE3078-8B89-4550-B497-93E4DADBD57E}"/>
+              </a:ext>
+            </a:extLst>
+          </p:cNvPr>
+          <p:cNvSpPr>
+            <a:spLocks noGrp="1"/>
+          </p:cNvSpPr>
+          <p:nvPr>
+            <p:ph type="body" idx="1"/>
+          </p:nvPr>
+        </p:nvSpPr>
+        <p:spPr>
+          <a:xfrm>
+            <a:off x="786150" y="1142608"/>
+            <a:ext cx="7571700" cy="3626431"/>
+          </a:xfrm>
+        </p:spPr>
+        <p:txBody>
+          <a:bodyPr/>
+          <a:lstStyle/>
+          <a:p>
+            <a:pPr marL="76200" indent="0">
+              <a:buNone/>
+            </a:pPr>
+            <a:r>
+              <a:rPr lang="en-US" sz="1400"/>
+              <a:t>Import and use math</a:t>
+            </a:r>
+          </a:p>
+          <a:p>
+            <a:pPr marL="76200" indent="0">
+              <a:buNone/>
+            </a:pPr>
+            <a:r>
+              <a:rPr lang="en-US" sz="1100">
+                <a:latin typeface="Consolas" panose="020B0609020204030204" pitchFamily="49" charset="0"/>
+              </a:rPr>
+              <a:t>import </a:t>
+            </a:r>
+            <a:r>
+              <a:rPr lang="en-US" sz="1100">
+                <a:solidFill>
+                  <a:schemeClr val="accent1"/>
+                </a:solidFill>
+                <a:latin typeface="Consolas" panose="020B0609020204030204" pitchFamily="49" charset="0"/>
+              </a:rPr>
+              <a:t>requests</a:t>
+            </a:r>
+          </a:p>
+          <a:p>
+            <a:pPr marL="76200" indent="0">
+              <a:buNone/>
+            </a:pPr>
+            <a:r>
+              <a:rPr lang="en-US" sz="1100">
+                <a:latin typeface="Consolas" panose="020B0609020204030204" pitchFamily="49" charset="0"/>
+              </a:rPr>
+              <a:t>response = requests</a:t>
+            </a:r>
+            <a:r>
+              <a:rPr lang="en-US" sz="1100">
+                <a:solidFill>
+                  <a:schemeClr val="accent1"/>
+                </a:solidFill>
+                <a:latin typeface="Consolas" panose="020B0609020204030204" pitchFamily="49" charset="0"/>
+              </a:rPr>
+              <a:t>.get(</a:t>
+            </a:r>
+            <a:r>
+              <a:rPr lang="en-US" sz="1100">
+                <a:latin typeface="Consolas" panose="020B0609020204030204" pitchFamily="49" charset="0"/>
+              </a:rPr>
+              <a:t>'https://fipiran.com', </a:t>
+            </a:r>
+            <a:r>
+              <a:rPr lang="en-US" sz="1100">
+                <a:solidFill>
+                  <a:schemeClr val="accent1"/>
+                </a:solidFill>
+                <a:latin typeface="Consolas" panose="020B0609020204030204" pitchFamily="49" charset="0"/>
+              </a:rPr>
+              <a:t>timeout</a:t>
+            </a:r>
+            <a:r>
+              <a:rPr lang="en-US" sz="1100">
+                <a:latin typeface="Consolas" panose="020B0609020204030204" pitchFamily="49" charset="0"/>
+              </a:rPr>
+              <a:t> = 1</a:t>
+            </a:r>
+            <a:r>
+              <a:rPr lang="en-US" sz="1100">
+                <a:solidFill>
+                  <a:schemeClr val="accent1"/>
+                </a:solidFill>
+                <a:latin typeface="Consolas" panose="020B0609020204030204" pitchFamily="49" charset="0"/>
+              </a:rPr>
+              <a:t>)</a:t>
+            </a:r>
+          </a:p>
+          <a:p>
+            <a:pPr marL="76200" indent="0">
+              <a:buNone/>
+            </a:pPr>
+            <a:r>
+              <a:rPr lang="en-US" sz="1100">
+                <a:latin typeface="Consolas" panose="020B0609020204030204" pitchFamily="49" charset="0"/>
+              </a:rPr>
+              <a:t>print(response)</a:t>
+            </a:r>
+          </a:p>
+          <a:p>
+            <a:pPr marL="76200" indent="0">
+              <a:buNone/>
+            </a:pPr>
+            <a:r>
+              <a:rPr lang="en-US" sz="1100">
+                <a:latin typeface="Consolas" panose="020B0609020204030204" pitchFamily="49" charset="0"/>
+              </a:rPr>
+              <a:t>print(response</a:t>
+            </a:r>
+            <a:r>
+              <a:rPr lang="en-US" sz="1100">
+                <a:solidFill>
+                  <a:schemeClr val="accent1"/>
+                </a:solidFill>
+                <a:latin typeface="Consolas" panose="020B0609020204030204" pitchFamily="49" charset="0"/>
+              </a:rPr>
+              <a:t>.status_code</a:t>
+            </a:r>
+            <a:r>
+              <a:rPr lang="en-US" sz="1100">
+                <a:latin typeface="Consolas" panose="020B0609020204030204" pitchFamily="49" charset="0"/>
+              </a:rPr>
+              <a:t>)</a:t>
+            </a:r>
+          </a:p>
+          <a:p>
+            <a:pPr marL="76200" indent="0">
+              <a:buNone/>
+            </a:pPr>
+            <a:r>
+              <a:rPr lang="en-US" sz="1100">
+                <a:latin typeface="Consolas" panose="020B0609020204030204" pitchFamily="49" charset="0"/>
+              </a:rPr>
+              <a:t>print(response</a:t>
+            </a:r>
+            <a:r>
+              <a:rPr lang="en-US" sz="1100">
+                <a:solidFill>
+                  <a:schemeClr val="accent1"/>
+                </a:solidFill>
+                <a:latin typeface="Consolas" panose="020B0609020204030204" pitchFamily="49" charset="0"/>
+              </a:rPr>
+              <a:t>.encoding</a:t>
+            </a:r>
+            <a:r>
+              <a:rPr lang="en-US" sz="1100">
+                <a:latin typeface="Consolas" panose="020B0609020204030204" pitchFamily="49" charset="0"/>
+              </a:rPr>
+              <a:t>)</a:t>
+            </a:r>
+          </a:p>
+          <a:p>
+            <a:pPr marL="76200" indent="0">
+              <a:buNone/>
+            </a:pPr>
+            <a:r>
+              <a:rPr lang="en-US" sz="1100">
+                <a:latin typeface="Consolas" panose="020B0609020204030204" pitchFamily="49" charset="0"/>
+              </a:rPr>
+              <a:t>print(response</a:t>
+            </a:r>
+            <a:r>
+              <a:rPr lang="en-US" sz="1100">
+                <a:solidFill>
+                  <a:schemeClr val="accent1"/>
+                </a:solidFill>
+                <a:latin typeface="Consolas" panose="020B0609020204030204" pitchFamily="49" charset="0"/>
+              </a:rPr>
+              <a:t>.text</a:t>
+            </a:r>
+            <a:r>
+              <a:rPr lang="en-US" sz="1100">
+                <a:latin typeface="Consolas" panose="020B0609020204030204" pitchFamily="49" charset="0"/>
+              </a:rPr>
+              <a:t>)</a:t>
+            </a:r>
+          </a:p>
+        </p:txBody>
+      </p:sp>
+      <p:sp>
+        <p:nvSpPr>
+          <p:cNvPr id="4" name="Slide Number Placeholder 3">
+            <a:extLst>
+              <a:ext uri="{FF2B5EF4-FFF2-40B4-BE49-F238E27FC236}">
+                <a16:creationId xmlns:a16="http://schemas.microsoft.com/office/drawing/2014/main" id="{64987AE6-EC0E-43DD-9376-95A5602EE5E1}"/>
+              </a:ext>
+            </a:extLst>
+          </p:cNvPr>
+          <p:cNvSpPr>
+            <a:spLocks noGrp="1"/>
+          </p:cNvSpPr>
+          <p:nvPr>
+            <p:ph type="sldNum" idx="12"/>
+          </p:nvPr>
+        </p:nvSpPr>
+        <p:spPr/>
+        <p:txBody>
+          <a:bodyPr/>
+          <a:lstStyle/>
+          <a:p>
+            <a:pPr marL="0" lvl="0" indent="0" algn="r" rtl="0">
+              <a:spcBef>
+                <a:spcPts val="0"/>
+              </a:spcBef>
+              <a:spcAft>
+                <a:spcPts val="0"/>
+              </a:spcAft>
+              <a:buNone/>
+            </a:pPr>
+            <a:fld id="{00000000-1234-1234-1234-123412341234}" type="slidenum">
+              <a:rPr lang="en" smtClean="0"/>
+              <a:t>44</a:t>
+            </a:fld>
+            <a:endParaRPr lang="en"/>
+          </a:p>
+        </p:txBody>
+      </p:sp>
+    </p:spTree>
+    <p:extLst>
+      <p:ext uri="{BB962C8B-B14F-4D97-AF65-F5344CB8AC3E}">
+        <p14:creationId xmlns:p14="http://schemas.microsoft.com/office/powerpoint/2010/main" val="2700775338"/>
       </p:ext>
     </p:extLst>
   </p:cSld>

</xml_diff>